<commit_message>
Corrected generation of fully qualified resource id
</commit_message>
<xml_diff>
--- a/samples/monitoring-hackathon/Guide.pptx
+++ b/samples/monitoring-hackathon/Guide.pptx
@@ -201,219 +201,6 @@
 </p1510:revInfo>
 </file>
 
-<file path=ppt/changesInfos/changesInfo1.xml><?xml version="1.0" encoding="utf-8"?>
-<pc:chgInfo xmlns:a="http://schemas.openxmlformats.org/drawingml/2006/main" xmlns:r="http://schemas.openxmlformats.org/officeDocument/2006/relationships" xmlns:ac="http://schemas.microsoft.com/office/drawing/2013/main/command" xmlns:pc="http://schemas.microsoft.com/office/powerpoint/2013/main/command">
-  <pc:docChgLst>
-    <pc:chgData name="Christoph Petersen" userId="4a3591d6-4c73-4eef-a71f-4d5773edb70d" providerId="ADAL" clId="{573CA250-24E3-4C27-8160-30F921E85DC4}"/>
-    <pc:docChg chg="undo redo custSel addSld delSld modSld modSection">
-      <pc:chgData name="Christoph Petersen" userId="4a3591d6-4c73-4eef-a71f-4d5773edb70d" providerId="ADAL" clId="{573CA250-24E3-4C27-8160-30F921E85DC4}" dt="2018-12-18T21:50:41.086" v="1375" actId="20577"/>
-      <pc:docMkLst>
-        <pc:docMk/>
-      </pc:docMkLst>
-      <pc:sldChg chg="modSp">
-        <pc:chgData name="Christoph Petersen" userId="4a3591d6-4c73-4eef-a71f-4d5773edb70d" providerId="ADAL" clId="{573CA250-24E3-4C27-8160-30F921E85DC4}" dt="2018-12-18T21:16:17.279" v="753" actId="20577"/>
-        <pc:sldMkLst>
-          <pc:docMk/>
-          <pc:sldMk cId="3671262658" sldId="1858"/>
-        </pc:sldMkLst>
-        <pc:spChg chg="mod">
-          <ac:chgData name="Christoph Petersen" userId="4a3591d6-4c73-4eef-a71f-4d5773edb70d" providerId="ADAL" clId="{573CA250-24E3-4C27-8160-30F921E85DC4}" dt="2018-12-18T21:16:17.279" v="753" actId="20577"/>
-          <ac:spMkLst>
-            <pc:docMk/>
-            <pc:sldMk cId="3671262658" sldId="1858"/>
-            <ac:spMk id="5" creationId="{65C85B65-2A19-40CC-9ED4-B28AFB4AA413}"/>
-          </ac:spMkLst>
-        </pc:spChg>
-      </pc:sldChg>
-      <pc:sldChg chg="addSp delSp modSp">
-        <pc:chgData name="Christoph Petersen" userId="4a3591d6-4c73-4eef-a71f-4d5773edb70d" providerId="ADAL" clId="{573CA250-24E3-4C27-8160-30F921E85DC4}" dt="2018-12-18T21:07:43.285" v="663" actId="20577"/>
-        <pc:sldMkLst>
-          <pc:docMk/>
-          <pc:sldMk cId="3810454548" sldId="1859"/>
-        </pc:sldMkLst>
-        <pc:spChg chg="mod">
-          <ac:chgData name="Christoph Petersen" userId="4a3591d6-4c73-4eef-a71f-4d5773edb70d" providerId="ADAL" clId="{573CA250-24E3-4C27-8160-30F921E85DC4}" dt="2018-12-18T21:07:43.285" v="663" actId="20577"/>
-          <ac:spMkLst>
-            <pc:docMk/>
-            <pc:sldMk cId="3810454548" sldId="1859"/>
-            <ac:spMk id="3" creationId="{1F831BEA-B5D0-40C1-9C49-1B5511A85539}"/>
-          </ac:spMkLst>
-        </pc:spChg>
-        <pc:graphicFrameChg chg="add del mod">
-          <ac:chgData name="Christoph Petersen" userId="4a3591d6-4c73-4eef-a71f-4d5773edb70d" providerId="ADAL" clId="{573CA250-24E3-4C27-8160-30F921E85DC4}" dt="2018-12-18T11:26:12.592" v="121" actId="478"/>
-          <ac:graphicFrameMkLst>
-            <pc:docMk/>
-            <pc:sldMk cId="3810454548" sldId="1859"/>
-            <ac:graphicFrameMk id="4" creationId="{62B936B1-4DE1-4991-957E-9A401DA8C105}"/>
-          </ac:graphicFrameMkLst>
-        </pc:graphicFrameChg>
-      </pc:sldChg>
-      <pc:sldChg chg="modSp">
-        <pc:chgData name="Christoph Petersen" userId="4a3591d6-4c73-4eef-a71f-4d5773edb70d" providerId="ADAL" clId="{573CA250-24E3-4C27-8160-30F921E85DC4}" dt="2018-12-18T15:14:50.090" v="476" actId="20577"/>
-        <pc:sldMkLst>
-          <pc:docMk/>
-          <pc:sldMk cId="3931956952" sldId="1860"/>
-        </pc:sldMkLst>
-        <pc:spChg chg="mod">
-          <ac:chgData name="Christoph Petersen" userId="4a3591d6-4c73-4eef-a71f-4d5773edb70d" providerId="ADAL" clId="{573CA250-24E3-4C27-8160-30F921E85DC4}" dt="2018-12-18T15:14:50.090" v="476" actId="20577"/>
-          <ac:spMkLst>
-            <pc:docMk/>
-            <pc:sldMk cId="3931956952" sldId="1860"/>
-            <ac:spMk id="3" creationId="{A8B53F5F-A708-48C0-8E1A-00052D491203}"/>
-          </ac:spMkLst>
-        </pc:spChg>
-      </pc:sldChg>
-      <pc:sldChg chg="modSp">
-        <pc:chgData name="Christoph Petersen" userId="4a3591d6-4c73-4eef-a71f-4d5773edb70d" providerId="ADAL" clId="{573CA250-24E3-4C27-8160-30F921E85DC4}" dt="2018-12-18T19:59:23.795" v="626" actId="20577"/>
-        <pc:sldMkLst>
-          <pc:docMk/>
-          <pc:sldMk cId="1111339084" sldId="1861"/>
-        </pc:sldMkLst>
-        <pc:spChg chg="mod">
-          <ac:chgData name="Christoph Petersen" userId="4a3591d6-4c73-4eef-a71f-4d5773edb70d" providerId="ADAL" clId="{573CA250-24E3-4C27-8160-30F921E85DC4}" dt="2018-12-18T19:59:23.795" v="626" actId="20577"/>
-          <ac:spMkLst>
-            <pc:docMk/>
-            <pc:sldMk cId="1111339084" sldId="1861"/>
-            <ac:spMk id="3" creationId="{1F831BEA-B5D0-40C1-9C49-1B5511A85539}"/>
-          </ac:spMkLst>
-        </pc:spChg>
-      </pc:sldChg>
-      <pc:sldChg chg="add del">
-        <pc:chgData name="Christoph Petersen" userId="4a3591d6-4c73-4eef-a71f-4d5773edb70d" providerId="ADAL" clId="{573CA250-24E3-4C27-8160-30F921E85DC4}" dt="2018-12-18T21:41:38.424" v="756" actId="2696"/>
-        <pc:sldMkLst>
-          <pc:docMk/>
-          <pc:sldMk cId="624293686" sldId="1862"/>
-        </pc:sldMkLst>
-      </pc:sldChg>
-      <pc:sldChg chg="addSp delSp modSp add">
-        <pc:chgData name="Christoph Petersen" userId="4a3591d6-4c73-4eef-a71f-4d5773edb70d" providerId="ADAL" clId="{573CA250-24E3-4C27-8160-30F921E85DC4}" dt="2018-12-18T21:50:41.086" v="1375" actId="20577"/>
-        <pc:sldMkLst>
-          <pc:docMk/>
-          <pc:sldMk cId="3004418460" sldId="1863"/>
-        </pc:sldMkLst>
-        <pc:spChg chg="mod">
-          <ac:chgData name="Christoph Petersen" userId="4a3591d6-4c73-4eef-a71f-4d5773edb70d" providerId="ADAL" clId="{573CA250-24E3-4C27-8160-30F921E85DC4}" dt="2018-12-18T21:44:33.021" v="1024"/>
-          <ac:spMkLst>
-            <pc:docMk/>
-            <pc:sldMk cId="3004418460" sldId="1863"/>
-            <ac:spMk id="2" creationId="{481E5873-02DA-441D-A306-D508C39F2360}"/>
-          </ac:spMkLst>
-        </pc:spChg>
-        <pc:spChg chg="mod">
-          <ac:chgData name="Christoph Petersen" userId="4a3591d6-4c73-4eef-a71f-4d5773edb70d" providerId="ADAL" clId="{573CA250-24E3-4C27-8160-30F921E85DC4}" dt="2018-12-18T21:50:41.086" v="1375" actId="20577"/>
-          <ac:spMkLst>
-            <pc:docMk/>
-            <pc:sldMk cId="3004418460" sldId="1863"/>
-            <ac:spMk id="3" creationId="{1F831BEA-B5D0-40C1-9C49-1B5511A85539}"/>
-          </ac:spMkLst>
-        </pc:spChg>
-        <pc:spChg chg="add del">
-          <ac:chgData name="Christoph Petersen" userId="4a3591d6-4c73-4eef-a71f-4d5773edb70d" providerId="ADAL" clId="{573CA250-24E3-4C27-8160-30F921E85DC4}" dt="2018-12-18T21:45:23.428" v="1055"/>
-          <ac:spMkLst>
-            <pc:docMk/>
-            <pc:sldMk cId="3004418460" sldId="1863"/>
-            <ac:spMk id="4" creationId="{3289EAA5-E61C-484C-BC10-388D6D746FC2}"/>
-          </ac:spMkLst>
-        </pc:spChg>
-      </pc:sldChg>
-    </pc:docChg>
-  </pc:docChgLst>
-  <pc:docChgLst>
-    <pc:chgData name="Christoph Petersen" userId="4a3591d6-4c73-4eef-a71f-4d5773edb70d" providerId="ADAL" clId="{95F97583-7A4A-43DC-A767-F16AD6BC1F8C}"/>
-    <pc:docChg chg="undo custSel addSld modSld modSection">
-      <pc:chgData name="Christoph Petersen" userId="4a3591d6-4c73-4eef-a71f-4d5773edb70d" providerId="ADAL" clId="{95F97583-7A4A-43DC-A767-F16AD6BC1F8C}" dt="2018-12-14T09:23:09.524" v="3211" actId="13926"/>
-      <pc:docMkLst>
-        <pc:docMk/>
-      </pc:docMkLst>
-      <pc:sldChg chg="modSp">
-        <pc:chgData name="Christoph Petersen" userId="4a3591d6-4c73-4eef-a71f-4d5773edb70d" providerId="ADAL" clId="{95F97583-7A4A-43DC-A767-F16AD6BC1F8C}" dt="2018-12-14T09:15:59.342" v="2320" actId="20577"/>
-        <pc:sldMkLst>
-          <pc:docMk/>
-          <pc:sldMk cId="3671262658" sldId="1858"/>
-        </pc:sldMkLst>
-        <pc:spChg chg="mod">
-          <ac:chgData name="Christoph Petersen" userId="4a3591d6-4c73-4eef-a71f-4d5773edb70d" providerId="ADAL" clId="{95F97583-7A4A-43DC-A767-F16AD6BC1F8C}" dt="2018-12-14T09:15:59.342" v="2320" actId="20577"/>
-          <ac:spMkLst>
-            <pc:docMk/>
-            <pc:sldMk cId="3671262658" sldId="1858"/>
-            <ac:spMk id="5" creationId="{65C85B65-2A19-40CC-9ED4-B28AFB4AA413}"/>
-          </ac:spMkLst>
-        </pc:spChg>
-      </pc:sldChg>
-      <pc:sldChg chg="modSp new add">
-        <pc:chgData name="Christoph Petersen" userId="4a3591d6-4c73-4eef-a71f-4d5773edb70d" providerId="ADAL" clId="{95F97583-7A4A-43DC-A767-F16AD6BC1F8C}" dt="2018-12-14T09:22:50.385" v="3203" actId="13926"/>
-        <pc:sldMkLst>
-          <pc:docMk/>
-          <pc:sldMk cId="3810454548" sldId="1859"/>
-        </pc:sldMkLst>
-        <pc:spChg chg="mod">
-          <ac:chgData name="Christoph Petersen" userId="4a3591d6-4c73-4eef-a71f-4d5773edb70d" providerId="ADAL" clId="{95F97583-7A4A-43DC-A767-F16AD6BC1F8C}" dt="2018-12-14T08:47:09.229" v="966" actId="20577"/>
-          <ac:spMkLst>
-            <pc:docMk/>
-            <pc:sldMk cId="3810454548" sldId="1859"/>
-            <ac:spMk id="2" creationId="{481E5873-02DA-441D-A306-D508C39F2360}"/>
-          </ac:spMkLst>
-        </pc:spChg>
-        <pc:spChg chg="mod">
-          <ac:chgData name="Christoph Petersen" userId="4a3591d6-4c73-4eef-a71f-4d5773edb70d" providerId="ADAL" clId="{95F97583-7A4A-43DC-A767-F16AD6BC1F8C}" dt="2018-12-14T09:22:50.385" v="3203" actId="13926"/>
-          <ac:spMkLst>
-            <pc:docMk/>
-            <pc:sldMk cId="3810454548" sldId="1859"/>
-            <ac:spMk id="3" creationId="{1F831BEA-B5D0-40C1-9C49-1B5511A85539}"/>
-          </ac:spMkLst>
-        </pc:spChg>
-      </pc:sldChg>
-      <pc:sldChg chg="modSp new add">
-        <pc:chgData name="Christoph Petersen" userId="4a3591d6-4c73-4eef-a71f-4d5773edb70d" providerId="ADAL" clId="{95F97583-7A4A-43DC-A767-F16AD6BC1F8C}" dt="2018-12-14T09:23:09.524" v="3211" actId="13926"/>
-        <pc:sldMkLst>
-          <pc:docMk/>
-          <pc:sldMk cId="3931956952" sldId="1860"/>
-        </pc:sldMkLst>
-        <pc:spChg chg="mod">
-          <ac:chgData name="Christoph Petersen" userId="4a3591d6-4c73-4eef-a71f-4d5773edb70d" providerId="ADAL" clId="{95F97583-7A4A-43DC-A767-F16AD6BC1F8C}" dt="2018-12-14T08:47:23.027" v="1020" actId="20577"/>
-          <ac:spMkLst>
-            <pc:docMk/>
-            <pc:sldMk cId="3931956952" sldId="1860"/>
-            <ac:spMk id="2" creationId="{821BD5F6-A927-476D-9BD4-709579B3D231}"/>
-          </ac:spMkLst>
-        </pc:spChg>
-        <pc:spChg chg="mod">
-          <ac:chgData name="Christoph Petersen" userId="4a3591d6-4c73-4eef-a71f-4d5773edb70d" providerId="ADAL" clId="{95F97583-7A4A-43DC-A767-F16AD6BC1F8C}" dt="2018-12-14T09:23:09.524" v="3211" actId="13926"/>
-          <ac:spMkLst>
-            <pc:docMk/>
-            <pc:sldMk cId="3931956952" sldId="1860"/>
-            <ac:spMk id="3" creationId="{A8B53F5F-A708-48C0-8E1A-00052D491203}"/>
-          </ac:spMkLst>
-        </pc:spChg>
-      </pc:sldChg>
-      <pc:sldChg chg="modSp add">
-        <pc:chgData name="Christoph Petersen" userId="4a3591d6-4c73-4eef-a71f-4d5773edb70d" providerId="ADAL" clId="{95F97583-7A4A-43DC-A767-F16AD6BC1F8C}" dt="2018-12-14T09:21:26.281" v="3051" actId="13926"/>
-        <pc:sldMkLst>
-          <pc:docMk/>
-          <pc:sldMk cId="1111339084" sldId="1861"/>
-        </pc:sldMkLst>
-        <pc:spChg chg="mod">
-          <ac:chgData name="Christoph Petersen" userId="4a3591d6-4c73-4eef-a71f-4d5773edb70d" providerId="ADAL" clId="{95F97583-7A4A-43DC-A767-F16AD6BC1F8C}" dt="2018-12-14T09:15:43.934" v="2262" actId="404"/>
-          <ac:spMkLst>
-            <pc:docMk/>
-            <pc:sldMk cId="1111339084" sldId="1861"/>
-            <ac:spMk id="2" creationId="{481E5873-02DA-441D-A306-D508C39F2360}"/>
-          </ac:spMkLst>
-        </pc:spChg>
-        <pc:spChg chg="mod">
-          <ac:chgData name="Christoph Petersen" userId="4a3591d6-4c73-4eef-a71f-4d5773edb70d" providerId="ADAL" clId="{95F97583-7A4A-43DC-A767-F16AD6BC1F8C}" dt="2018-12-14T09:21:26.281" v="3051" actId="13926"/>
-          <ac:spMkLst>
-            <pc:docMk/>
-            <pc:sldMk cId="1111339084" sldId="1861"/>
-            <ac:spMk id="3" creationId="{1F831BEA-B5D0-40C1-9C49-1B5511A85539}"/>
-          </ac:spMkLst>
-        </pc:spChg>
-      </pc:sldChg>
-    </pc:docChg>
-  </pc:docChgLst>
-</pc:chgInfo>
-</file>
-
 <file path=ppt/handoutMasters/handoutMaster1.xml><?xml version="1.0" encoding="utf-8"?>
 <p:handoutMaster xmlns:a="http://schemas.openxmlformats.org/drawingml/2006/main" xmlns:r="http://schemas.openxmlformats.org/officeDocument/2006/relationships" xmlns:p="http://schemas.openxmlformats.org/presentationml/2006/main">
   <p:cSld>
@@ -500,7 +287,7 @@
               <a:rPr lang="en-US" smtClean="0">
                 <a:latin typeface="Segoe UI" pitchFamily="34" charset="0"/>
               </a:rPr>
-              <a:t>1/7/2019 1:23 PM</a:t>
+              <a:t>01/09/2019 10:43</a:t>
             </a:fld>
             <a:endParaRPr lang="en-US" dirty="0">
               <a:latin typeface="Segoe UI" pitchFamily="34" charset="0"/>
@@ -778,7 +565,7 @@
           <a:p>
             <a:fld id="{386CE63F-9E7F-4C04-9D0D-FCA25A8E9E86}" type="datetime8">
               <a:rPr lang="en-US" smtClean="0"/>
-              <a:t>1/7/2019 1:23 PM</a:t>
+              <a:t>01/09/2019 09:27</a:t>
             </a:fld>
             <a:endParaRPr lang="en-US" dirty="0"/>
           </a:p>
@@ -15806,28 +15593,33 @@
             <a:pPr lvl="2"/>
             <a:r>
               <a:rPr lang="de-DE" dirty="0"/>
-              <a:t>Add collection of counters on </a:t>
-            </a:r>
-            <a:r>
-              <a:rPr lang="de-DE" b="1" dirty="0"/>
-              <a:t>vm0</a:t>
-            </a:r>
-            <a:r>
-              <a:rPr lang="de-DE" dirty="0"/>
+              <a:t>Add collection of counters </a:t>
+            </a:r>
+            <a:r>
+              <a:rPr lang="de-DE"/>
+              <a:t>on </a:t>
+            </a:r>
+            <a:r>
+              <a:rPr lang="de-DE" b="1"/>
+              <a:t>vmw0</a:t>
+            </a:r>
+            <a:r>
+              <a:rPr lang="de-DE"/>
               <a:t>, </a:t>
             </a:r>
             <a:r>
-              <a:rPr lang="de-DE" b="1" dirty="0"/>
-              <a:t>vm1</a:t>
-            </a:r>
-            <a:r>
-              <a:rPr lang="de-DE" dirty="0"/>
+              <a:rPr lang="de-DE" b="1"/>
+              <a:t>vmw1</a:t>
+            </a:r>
+            <a:r>
+              <a:rPr lang="de-DE"/>
               <a:t>, and </a:t>
             </a:r>
             <a:r>
-              <a:rPr lang="de-DE" b="1" dirty="0"/>
-              <a:t>vm2</a:t>
-            </a:r>
+              <a:rPr lang="de-DE" b="1"/>
+              <a:t>vmw2</a:t>
+            </a:r>
+            <a:endParaRPr lang="de-DE" b="1" dirty="0"/>
           </a:p>
           <a:p>
             <a:pPr lvl="3"/>
@@ -16335,7 +16127,7 @@
             </a:r>
             <a:r>
               <a:rPr lang="de-DE" b="1" dirty="0"/>
-              <a:t>vm0</a:t>
+              <a:t>vmw0</a:t>
             </a:r>
             <a:r>
               <a:rPr lang="de-DE" dirty="0"/>
@@ -16343,7 +16135,7 @@
             </a:r>
             <a:r>
               <a:rPr lang="de-DE" b="1" dirty="0"/>
-              <a:t>vm1</a:t>
+              <a:t>vmw1</a:t>
             </a:r>
             <a:r>
               <a:rPr lang="de-DE" dirty="0"/>
@@ -16351,7 +16143,7 @@
             </a:r>
             <a:r>
               <a:rPr lang="de-DE" b="1" dirty="0"/>
-              <a:t>vm2</a:t>
+              <a:t>vmw2</a:t>
             </a:r>
           </a:p>
           <a:p>
@@ -17854,6 +17646,21 @@
 </file>
 
 <file path=customXml/item1.xml><?xml version="1.0" encoding="utf-8"?>
+<p:properties xmlns:p="http://schemas.microsoft.com/office/2006/metadata/properties" xmlns:xsi="http://www.w3.org/2001/XMLSchema-instance" xmlns:pc="http://schemas.microsoft.com/office/infopath/2007/PartnerControls">
+  <documentManagement/>
+</p:properties>
+</file>
+
+<file path=customXml/item2.xml><?xml version="1.0" encoding="utf-8"?>
+<?mso-contentType ?>
+<FormTemplates xmlns="http://schemas.microsoft.com/sharepoint/v3/contenttype/forms">
+  <Display>DocumentLibraryForm</Display>
+  <Edit>DocumentLibraryForm</Edit>
+  <New>DocumentLibraryForm</New>
+</FormTemplates>
+</file>
+
+<file path=customXml/item3.xml><?xml version="1.0" encoding="utf-8"?>
 <ct:contentTypeSchema xmlns:ct="http://schemas.microsoft.com/office/2006/metadata/contentType" xmlns:ma="http://schemas.microsoft.com/office/2006/metadata/properties/metaAttributes" ct:_="" ma:_="" ma:contentTypeName="Document" ma:contentTypeID="0x010100A2B0BB5962AB3C45A9A1CE1EC4C4F647" ma:contentTypeVersion="3" ma:contentTypeDescription="Create a new document." ma:contentTypeScope="" ma:versionID="f0876370c90de824ab54c09b0bd2a056">
   <xsd:schema xmlns:xsd="http://www.w3.org/2001/XMLSchema" xmlns:xs="http://www.w3.org/2001/XMLSchema" xmlns:p="http://schemas.microsoft.com/office/2006/metadata/properties" xmlns:ns3="630a2e83-186a-4a0f-ab27-bee8a8096abc" targetNamespace="http://schemas.microsoft.com/office/2006/metadata/properties" ma:root="true" ma:fieldsID="a2a3b5ed8b4accd7c8a398d0cb075271" ns3:_="">
     <xsd:import namespace="630a2e83-186a-4a0f-ab27-bee8a8096abc"/>
@@ -18007,22 +17814,31 @@
 </ct:contentTypeSchema>
 </file>
 
-<file path=customXml/item2.xml><?xml version="1.0" encoding="utf-8"?>
-<?mso-contentType ?>
-<FormTemplates xmlns="http://schemas.microsoft.com/sharepoint/v3/contenttype/forms">
-  <Display>DocumentLibraryForm</Display>
-  <Edit>DocumentLibraryForm</Edit>
-  <New>DocumentLibraryForm</New>
-</FormTemplates>
+<file path=customXml/itemProps1.xml><?xml version="1.0" encoding="utf-8"?>
+<ds:datastoreItem xmlns:ds="http://schemas.openxmlformats.org/officeDocument/2006/customXml" ds:itemID="{F990F116-B58F-4255-B05B-DA3808E0E5C6}">
+  <ds:schemaRefs>
+    <ds:schemaRef ds:uri="630a2e83-186a-4a0f-ab27-bee8a8096abc"/>
+    <ds:schemaRef ds:uri="http://schemas.microsoft.com/office/infopath/2007/PartnerControls"/>
+    <ds:schemaRef ds:uri="http://purl.org/dc/dcmitype/"/>
+    <ds:schemaRef ds:uri="http://schemas.microsoft.com/office/2006/documentManagement/types"/>
+    <ds:schemaRef ds:uri="http://www.w3.org/XML/1998/namespace"/>
+    <ds:schemaRef ds:uri="http://schemas.openxmlformats.org/package/2006/metadata/core-properties"/>
+    <ds:schemaRef ds:uri="http://purl.org/dc/elements/1.1/"/>
+    <ds:schemaRef ds:uri="http://schemas.microsoft.com/office/2006/metadata/properties"/>
+    <ds:schemaRef ds:uri="http://purl.org/dc/terms/"/>
+  </ds:schemaRefs>
+</ds:datastoreItem>
 </file>
 
-<file path=customXml/item3.xml><?xml version="1.0" encoding="utf-8"?>
-<p:properties xmlns:p="http://schemas.microsoft.com/office/2006/metadata/properties" xmlns:xsi="http://www.w3.org/2001/XMLSchema-instance" xmlns:pc="http://schemas.microsoft.com/office/infopath/2007/PartnerControls">
-  <documentManagement/>
-</p:properties>
+<file path=customXml/itemProps2.xml><?xml version="1.0" encoding="utf-8"?>
+<ds:datastoreItem xmlns:ds="http://schemas.openxmlformats.org/officeDocument/2006/customXml" ds:itemID="{758FDAC0-319D-4A54-8D8E-1D42CB1F8004}">
+  <ds:schemaRefs>
+    <ds:schemaRef ds:uri="http://schemas.microsoft.com/sharepoint/v3/contenttype/forms"/>
+  </ds:schemaRefs>
+</ds:datastoreItem>
 </file>
 
-<file path=customXml/itemProps1.xml><?xml version="1.0" encoding="utf-8"?>
+<file path=customXml/itemProps3.xml><?xml version="1.0" encoding="utf-8"?>
 <ds:datastoreItem xmlns:ds="http://schemas.openxmlformats.org/officeDocument/2006/customXml" ds:itemID="{F330841A-A209-44E7-824E-9DDB4DE0DC3C}">
   <ds:schemaRefs>
     <ds:schemaRef ds:uri="http://schemas.microsoft.com/office/2006/metadata/contentType"/>
@@ -18038,28 +17854,4 @@
     <ds:schemaRef ds:uri="http://schemas.microsoft.com/internal/obd"/>
   </ds:schemaRefs>
 </ds:datastoreItem>
-</file>
-
-<file path=customXml/itemProps2.xml><?xml version="1.0" encoding="utf-8"?>
-<ds:datastoreItem xmlns:ds="http://schemas.openxmlformats.org/officeDocument/2006/customXml" ds:itemID="{758FDAC0-319D-4A54-8D8E-1D42CB1F8004}">
-  <ds:schemaRefs>
-    <ds:schemaRef ds:uri="http://schemas.microsoft.com/sharepoint/v3/contenttype/forms"/>
-  </ds:schemaRefs>
-</ds:datastoreItem>
-</file>
-
-<file path=customXml/itemProps3.xml><?xml version="1.0" encoding="utf-8"?>
-<ds:datastoreItem xmlns:ds="http://schemas.openxmlformats.org/officeDocument/2006/customXml" ds:itemID="{F990F116-B58F-4255-B05B-DA3808E0E5C6}">
-  <ds:schemaRefs>
-    <ds:schemaRef ds:uri="630a2e83-186a-4a0f-ab27-bee8a8096abc"/>
-    <ds:schemaRef ds:uri="http://schemas.microsoft.com/office/infopath/2007/PartnerControls"/>
-    <ds:schemaRef ds:uri="http://purl.org/dc/dcmitype/"/>
-    <ds:schemaRef ds:uri="http://schemas.microsoft.com/office/2006/documentManagement/types"/>
-    <ds:schemaRef ds:uri="http://www.w3.org/XML/1998/namespace"/>
-    <ds:schemaRef ds:uri="http://schemas.openxmlformats.org/package/2006/metadata/core-properties"/>
-    <ds:schemaRef ds:uri="http://purl.org/dc/elements/1.1/"/>
-    <ds:schemaRef ds:uri="http://schemas.microsoft.com/office/2006/metadata/properties"/>
-    <ds:schemaRef ds:uri="http://purl.org/dc/terms/"/>
-  </ds:schemaRefs>
-</ds:datastoreItem>
 </file>
</xml_diff>

<commit_message>
Updated challenge descriptions and resource links
</commit_message>
<xml_diff>
--- a/samples/monitoring-hackathon/Guide.pptx
+++ b/samples/monitoring-hackathon/Guide.pptx
@@ -17817,15 +17817,15 @@
 <file path=customXml/itemProps1.xml><?xml version="1.0" encoding="utf-8"?>
 <ds:datastoreItem xmlns:ds="http://schemas.openxmlformats.org/officeDocument/2006/customXml" ds:itemID="{F990F116-B58F-4255-B05B-DA3808E0E5C6}">
   <ds:schemaRefs>
+    <ds:schemaRef ds:uri="http://purl.org/dc/elements/1.1/"/>
     <ds:schemaRef ds:uri="630a2e83-186a-4a0f-ab27-bee8a8096abc"/>
-    <ds:schemaRef ds:uri="http://schemas.microsoft.com/office/infopath/2007/PartnerControls"/>
-    <ds:schemaRef ds:uri="http://purl.org/dc/dcmitype/"/>
+    <ds:schemaRef ds:uri="http://purl.org/dc/terms/"/>
     <ds:schemaRef ds:uri="http://schemas.microsoft.com/office/2006/documentManagement/types"/>
     <ds:schemaRef ds:uri="http://www.w3.org/XML/1998/namespace"/>
+    <ds:schemaRef ds:uri="http://purl.org/dc/dcmitype/"/>
+    <ds:schemaRef ds:uri="http://schemas.microsoft.com/office/infopath/2007/PartnerControls"/>
     <ds:schemaRef ds:uri="http://schemas.openxmlformats.org/package/2006/metadata/core-properties"/>
-    <ds:schemaRef ds:uri="http://purl.org/dc/elements/1.1/"/>
     <ds:schemaRef ds:uri="http://schemas.microsoft.com/office/2006/metadata/properties"/>
-    <ds:schemaRef ds:uri="http://purl.org/dc/terms/"/>
   </ds:schemaRefs>
 </ds:datastoreItem>
 </file>

</xml_diff>